<commit_message>
Added spike transcoding tutorial
</commit_message>
<xml_diff>
--- a/manual/figs.pptx
+++ b/manual/figs.pptx
@@ -6,6 +6,7 @@
   </p:sldMasterIdLst>
   <p:sldIdLst>
     <p:sldId id="256" r:id="rId2"/>
+    <p:sldId id="257" r:id="rId3"/>
   </p:sldIdLst>
   <p:sldSz cx="12192000" cy="6858000"/>
   <p:notesSz cx="6858000" cy="9144000"/>
@@ -104,6 +105,11 @@
       </a:defRPr>
     </a:lvl9pPr>
   </p:defaultTextStyle>
+  <p:extLst>
+    <p:ext uri="{EFAFB233-063F-42B5-8137-9DF3F51BA10A}">
+      <p15:sldGuideLst xmlns:p15="http://schemas.microsoft.com/office/powerpoint/2012/main"/>
+    </p:ext>
+  </p:extLst>
 </p:presentation>
 </file>
 
@@ -525,12 +531,12 @@
         </c:dLbls>
         <c:gapWidth val="219"/>
         <c:shape val="box"/>
-        <c:axId val="326450344"/>
-        <c:axId val="326453088"/>
+        <c:axId val="334116040"/>
+        <c:axId val="334117608"/>
         <c:axId val="0"/>
       </c:bar3DChart>
       <c:catAx>
-        <c:axId val="326450344"/>
+        <c:axId val="334116040"/>
         <c:scaling>
           <c:orientation val="minMax"/>
         </c:scaling>
@@ -570,10 +576,10 @@
                 <a:cs typeface="+mn-cs"/>
               </a:defRPr>
             </a:pPr>
-            <a:endParaRPr lang="fr-FR"/>
+            <a:endParaRPr lang="en-US"/>
           </a:p>
         </c:txPr>
-        <c:crossAx val="326453088"/>
+        <c:crossAx val="334117608"/>
         <c:crosses val="autoZero"/>
         <c:auto val="0"/>
         <c:lblAlgn val="ctr"/>
@@ -581,7 +587,7 @@
         <c:noMultiLvlLbl val="0"/>
       </c:catAx>
       <c:valAx>
-        <c:axId val="326453088"/>
+        <c:axId val="334117608"/>
         <c:scaling>
           <c:logBase val="10"/>
           <c:orientation val="minMax"/>
@@ -661,7 +667,7 @@
                   <a:cs typeface="+mn-cs"/>
                 </a:defRPr>
               </a:pPr>
-              <a:endParaRPr lang="fr-FR"/>
+              <a:endParaRPr lang="en-US"/>
             </a:p>
           </c:txPr>
         </c:title>
@@ -693,10 +699,10 @@
                 <a:cs typeface="+mn-cs"/>
               </a:defRPr>
             </a:pPr>
-            <a:endParaRPr lang="fr-FR"/>
+            <a:endParaRPr lang="en-US"/>
           </a:p>
         </c:txPr>
-        <c:crossAx val="326450344"/>
+        <c:crossAx val="334116040"/>
         <c:crosses val="autoZero"/>
         <c:crossBetween val="between"/>
       </c:valAx>
@@ -726,7 +732,7 @@
       <a:pPr>
         <a:defRPr sz="1800"/>
       </a:pPr>
-      <a:endParaRPr lang="fr-FR"/>
+      <a:endParaRPr lang="en-US"/>
     </a:p>
   </c:txPr>
   <c:externalData r:id="rId4">
@@ -1409,7 +1415,7 @@
           <a:p>
             <a:fld id="{2A50C20C-7BED-4D85-BF56-B3E028E34684}" type="datetimeFigureOut">
               <a:rPr lang="fr-FR" smtClean="0"/>
-              <a:t>22/03/2016</a:t>
+              <a:t>01/03/2017</a:t>
             </a:fld>
             <a:endParaRPr lang="fr-FR"/>
           </a:p>
@@ -1579,7 +1585,7 @@
           <a:p>
             <a:fld id="{2A50C20C-7BED-4D85-BF56-B3E028E34684}" type="datetimeFigureOut">
               <a:rPr lang="fr-FR" smtClean="0"/>
-              <a:t>22/03/2016</a:t>
+              <a:t>01/03/2017</a:t>
             </a:fld>
             <a:endParaRPr lang="fr-FR"/>
           </a:p>
@@ -1759,7 +1765,7 @@
           <a:p>
             <a:fld id="{2A50C20C-7BED-4D85-BF56-B3E028E34684}" type="datetimeFigureOut">
               <a:rPr lang="fr-FR" smtClean="0"/>
-              <a:t>22/03/2016</a:t>
+              <a:t>01/03/2017</a:t>
             </a:fld>
             <a:endParaRPr lang="fr-FR"/>
           </a:p>
@@ -1929,7 +1935,7 @@
           <a:p>
             <a:fld id="{2A50C20C-7BED-4D85-BF56-B3E028E34684}" type="datetimeFigureOut">
               <a:rPr lang="fr-FR" smtClean="0"/>
-              <a:t>22/03/2016</a:t>
+              <a:t>01/03/2017</a:t>
             </a:fld>
             <a:endParaRPr lang="fr-FR"/>
           </a:p>
@@ -2175,7 +2181,7 @@
           <a:p>
             <a:fld id="{2A50C20C-7BED-4D85-BF56-B3E028E34684}" type="datetimeFigureOut">
               <a:rPr lang="fr-FR" smtClean="0"/>
-              <a:t>22/03/2016</a:t>
+              <a:t>01/03/2017</a:t>
             </a:fld>
             <a:endParaRPr lang="fr-FR"/>
           </a:p>
@@ -2407,7 +2413,7 @@
           <a:p>
             <a:fld id="{2A50C20C-7BED-4D85-BF56-B3E028E34684}" type="datetimeFigureOut">
               <a:rPr lang="fr-FR" smtClean="0"/>
-              <a:t>22/03/2016</a:t>
+              <a:t>01/03/2017</a:t>
             </a:fld>
             <a:endParaRPr lang="fr-FR"/>
           </a:p>
@@ -2774,7 +2780,7 @@
           <a:p>
             <a:fld id="{2A50C20C-7BED-4D85-BF56-B3E028E34684}" type="datetimeFigureOut">
               <a:rPr lang="fr-FR" smtClean="0"/>
-              <a:t>22/03/2016</a:t>
+              <a:t>01/03/2017</a:t>
             </a:fld>
             <a:endParaRPr lang="fr-FR"/>
           </a:p>
@@ -2892,7 +2898,7 @@
           <a:p>
             <a:fld id="{2A50C20C-7BED-4D85-BF56-B3E028E34684}" type="datetimeFigureOut">
               <a:rPr lang="fr-FR" smtClean="0"/>
-              <a:t>22/03/2016</a:t>
+              <a:t>01/03/2017</a:t>
             </a:fld>
             <a:endParaRPr lang="fr-FR"/>
           </a:p>
@@ -2987,7 +2993,7 @@
           <a:p>
             <a:fld id="{2A50C20C-7BED-4D85-BF56-B3E028E34684}" type="datetimeFigureOut">
               <a:rPr lang="fr-FR" smtClean="0"/>
-              <a:t>22/03/2016</a:t>
+              <a:t>01/03/2017</a:t>
             </a:fld>
             <a:endParaRPr lang="fr-FR"/>
           </a:p>
@@ -3264,7 +3270,7 @@
           <a:p>
             <a:fld id="{2A50C20C-7BED-4D85-BF56-B3E028E34684}" type="datetimeFigureOut">
               <a:rPr lang="fr-FR" smtClean="0"/>
-              <a:t>22/03/2016</a:t>
+              <a:t>01/03/2017</a:t>
             </a:fld>
             <a:endParaRPr lang="fr-FR"/>
           </a:p>
@@ -3517,7 +3523,7 @@
           <a:p>
             <a:fld id="{2A50C20C-7BED-4D85-BF56-B3E028E34684}" type="datetimeFigureOut">
               <a:rPr lang="fr-FR" smtClean="0"/>
-              <a:t>22/03/2016</a:t>
+              <a:t>01/03/2017</a:t>
             </a:fld>
             <a:endParaRPr lang="fr-FR"/>
           </a:p>
@@ -3730,7 +3736,7 @@
           <a:p>
             <a:fld id="{2A50C20C-7BED-4D85-BF56-B3E028E34684}" type="datetimeFigureOut">
               <a:rPr lang="fr-FR" smtClean="0"/>
-              <a:t>22/03/2016</a:t>
+              <a:t>01/03/2017</a:t>
             </a:fld>
             <a:endParaRPr lang="fr-FR"/>
           </a:p>
@@ -4615,6 +4621,263 @@
     <p:extLst>
       <p:ext uri="{BB962C8B-B14F-4D97-AF65-F5344CB8AC3E}">
         <p14:creationId xmlns:p14="http://schemas.microsoft.com/office/powerpoint/2010/main" val="3382632689"/>
+      </p:ext>
+    </p:extLst>
+  </p:cSld>
+  <p:clrMapOvr>
+    <a:masterClrMapping/>
+  </p:clrMapOvr>
+</p:sld>
+</file>
+
+<file path=ppt/slides/slide2.xml><?xml version="1.0" encoding="utf-8"?>
+<p:sld xmlns:a="http://schemas.openxmlformats.org/drawingml/2006/main" xmlns:r="http://schemas.openxmlformats.org/officeDocument/2006/relationships" xmlns:p="http://schemas.openxmlformats.org/presentationml/2006/main">
+  <p:cSld>
+    <p:spTree>
+      <p:nvGrpSpPr>
+        <p:cNvPr id="1" name=""/>
+        <p:cNvGrpSpPr/>
+        <p:nvPr/>
+      </p:nvGrpSpPr>
+      <p:grpSpPr>
+        <a:xfrm>
+          <a:off x="0" y="0"/>
+          <a:ext cx="0" cy="0"/>
+          <a:chOff x="0" y="0"/>
+          <a:chExt cx="0" cy="0"/>
+        </a:xfrm>
+      </p:grpSpPr>
+      <p:pic>
+        <p:nvPicPr>
+          <p:cNvPr id="6" name="Espace réservé du contenu 3"/>
+          <p:cNvPicPr>
+            <a:picLocks noGrp="1" noChangeAspect="1"/>
+          </p:cNvPicPr>
+          <p:nvPr>
+            <p:ph idx="1"/>
+          </p:nvPr>
+        </p:nvPicPr>
+        <p:blipFill>
+          <a:blip r:embed="rId2">
+            <a:extLst>
+              <a:ext uri="{28A0092B-C50C-407E-A947-70E740481C1C}">
+                <a14:useLocalDpi xmlns:a14="http://schemas.microsoft.com/office/drawing/2010/main" val="0"/>
+              </a:ext>
+            </a:extLst>
+          </a:blip>
+          <a:stretch>
+            <a:fillRect/>
+          </a:stretch>
+        </p:blipFill>
+        <p:spPr>
+          <a:xfrm>
+            <a:off x="99754" y="108065"/>
+            <a:ext cx="11976735" cy="6658495"/>
+          </a:xfrm>
+        </p:spPr>
+      </p:pic>
+      <p:sp>
+        <p:nvSpPr>
+          <p:cNvPr id="7" name="ZoneTexte 6"/>
+          <p:cNvSpPr txBox="1"/>
+          <p:nvPr/>
+        </p:nvSpPr>
+        <p:spPr>
+          <a:xfrm>
+            <a:off x="9714401" y="761404"/>
+            <a:ext cx="1656184" cy="338554"/>
+          </a:xfrm>
+          <a:prstGeom prst="rect">
+            <a:avLst/>
+          </a:prstGeom>
+          <a:noFill/>
+        </p:spPr>
+        <p:txBody>
+          <a:bodyPr wrap="square" rtlCol="0">
+            <a:spAutoFit/>
+          </a:bodyPr>
+          <a:lstStyle>
+            <a:defPPr>
+              <a:defRPr lang="fr-FR"/>
+            </a:defPPr>
+            <a:lvl1pPr>
+              <a:defRPr sz="1600">
+                <a:effectLst>
+                  <a:glow rad="101600">
+                    <a:schemeClr val="bg1">
+                      <a:alpha val="60000"/>
+                    </a:schemeClr>
+                  </a:glow>
+                </a:effectLst>
+                <a:latin typeface="Calibri" panose="020F0502020204030204" pitchFamily="34" charset="0"/>
+              </a:defRPr>
+            </a:lvl1pPr>
+          </a:lstStyle>
+          <a:p>
+            <a:r>
+              <a:rPr lang="en-US" smtClean="0"/>
+              <a:t>Image selection</a:t>
+            </a:r>
+            <a:endParaRPr lang="en-US"/>
+          </a:p>
+        </p:txBody>
+      </p:sp>
+      <p:sp>
+        <p:nvSpPr>
+          <p:cNvPr id="8" name="ZoneTexte 7"/>
+          <p:cNvSpPr txBox="1"/>
+          <p:nvPr/>
+        </p:nvSpPr>
+        <p:spPr>
+          <a:xfrm>
+            <a:off x="9350659" y="3437312"/>
+            <a:ext cx="2556285" cy="584775"/>
+          </a:xfrm>
+          <a:prstGeom prst="rect">
+            <a:avLst/>
+          </a:prstGeom>
+          <a:noFill/>
+        </p:spPr>
+        <p:txBody>
+          <a:bodyPr wrap="square" rtlCol="0">
+            <a:spAutoFit/>
+          </a:bodyPr>
+          <a:lstStyle>
+            <a:defPPr>
+              <a:defRPr lang="fr-FR"/>
+            </a:defPPr>
+            <a:lvl1pPr>
+              <a:defRPr sz="1600">
+                <a:effectLst>
+                  <a:glow rad="101600">
+                    <a:schemeClr val="bg1">
+                      <a:alpha val="60000"/>
+                    </a:schemeClr>
+                  </a:glow>
+                </a:effectLst>
+                <a:latin typeface="Calibri" panose="020F0502020204030204" pitchFamily="34" charset="0"/>
+              </a:defRPr>
+            </a:lvl1pPr>
+          </a:lstStyle>
+          <a:p>
+            <a:r>
+              <a:rPr lang="en-US" dirty="0" smtClean="0"/>
+              <a:t>Labels legend</a:t>
+            </a:r>
+          </a:p>
+          <a:p>
+            <a:r>
+              <a:rPr lang="en-US" dirty="0" smtClean="0"/>
+              <a:t>(object type)</a:t>
+            </a:r>
+            <a:endParaRPr lang="en-US" dirty="0"/>
+          </a:p>
+        </p:txBody>
+      </p:sp>
+      <p:sp>
+        <p:nvSpPr>
+          <p:cNvPr id="9" name="ZoneTexte 8"/>
+          <p:cNvSpPr txBox="1"/>
+          <p:nvPr/>
+        </p:nvSpPr>
+        <p:spPr>
+          <a:xfrm>
+            <a:off x="99754" y="3391145"/>
+            <a:ext cx="6916188" cy="338554"/>
+          </a:xfrm>
+          <a:prstGeom prst="rect">
+            <a:avLst/>
+          </a:prstGeom>
+          <a:noFill/>
+        </p:spPr>
+        <p:txBody>
+          <a:bodyPr wrap="square" rtlCol="0">
+            <a:spAutoFit/>
+          </a:bodyPr>
+          <a:lstStyle>
+            <a:defPPr>
+              <a:defRPr lang="fr-FR"/>
+            </a:defPPr>
+            <a:lvl1pPr>
+              <a:defRPr sz="1600">
+                <a:effectLst>
+                  <a:glow rad="101600">
+                    <a:schemeClr val="bg1">
+                      <a:alpha val="60000"/>
+                    </a:schemeClr>
+                  </a:glow>
+                </a:effectLst>
+                <a:latin typeface="Calibri" panose="020F0502020204030204" pitchFamily="34" charset="0"/>
+              </a:defRPr>
+            </a:lvl1pPr>
+          </a:lstStyle>
+          <a:p>
+            <a:r>
+              <a:rPr lang="en-US" dirty="0" smtClean="0"/>
+              <a:t>Network output estimation: pixels </a:t>
+            </a:r>
+            <a:r>
+              <a:rPr lang="en-US" dirty="0" smtClean="0"/>
+              <a:t>most probable </a:t>
+            </a:r>
+            <a:r>
+              <a:rPr lang="en-US" dirty="0" smtClean="0"/>
+              <a:t>object type</a:t>
+            </a:r>
+            <a:endParaRPr lang="en-US" dirty="0"/>
+          </a:p>
+        </p:txBody>
+      </p:sp>
+      <p:sp>
+        <p:nvSpPr>
+          <p:cNvPr id="10" name="ZoneTexte 9"/>
+          <p:cNvSpPr txBox="1"/>
+          <p:nvPr/>
+        </p:nvSpPr>
+        <p:spPr>
+          <a:xfrm>
+            <a:off x="99754" y="761404"/>
+            <a:ext cx="4148050" cy="338554"/>
+          </a:xfrm>
+          <a:prstGeom prst="rect">
+            <a:avLst/>
+          </a:prstGeom>
+          <a:noFill/>
+        </p:spPr>
+        <p:txBody>
+          <a:bodyPr wrap="square" rtlCol="0">
+            <a:spAutoFit/>
+          </a:bodyPr>
+          <a:lstStyle>
+            <a:defPPr>
+              <a:defRPr lang="fr-FR"/>
+            </a:defPPr>
+            <a:lvl1pPr>
+              <a:defRPr sz="1600">
+                <a:effectLst>
+                  <a:glow rad="101600">
+                    <a:schemeClr val="bg1">
+                      <a:alpha val="60000"/>
+                    </a:schemeClr>
+                  </a:glow>
+                </a:effectLst>
+                <a:latin typeface="Calibri" panose="020F0502020204030204" pitchFamily="34" charset="0"/>
+              </a:defRPr>
+            </a:lvl1pPr>
+          </a:lstStyle>
+          <a:p>
+            <a:r>
+              <a:rPr lang="en-US" dirty="0" smtClean="0"/>
+              <a:t>Pixels input label (dataset annotation)</a:t>
+            </a:r>
+            <a:endParaRPr lang="en-US" dirty="0"/>
+          </a:p>
+        </p:txBody>
+      </p:sp>
+    </p:spTree>
+    <p:extLst>
+      <p:ext uri="{BB962C8B-B14F-4D97-AF65-F5344CB8AC3E}">
+        <p14:creationId xmlns:p14="http://schemas.microsoft.com/office/powerpoint/2010/main" val="748229805"/>
       </p:ext>
     </p:extLst>
   </p:cSld>

</xml_diff>